<commit_message>
new folder with finals
</commit_message>
<xml_diff>
--- a/Draft_September_2022/Figure_1.pptx
+++ b/Draft_September_2022/Figure_1.pptx
@@ -261,7 +261,7 @@
           <a:p>
             <a:fld id="{4CCD7980-6279-3847-9153-1CCE5938AC85}" type="datetimeFigureOut">
               <a:rPr lang="en-CH" smtClean="0"/>
-              <a:t>20.09.22</a:t>
+              <a:t>20.04.23</a:t>
             </a:fld>
             <a:endParaRPr lang="en-CH"/>
           </a:p>
@@ -461,7 +461,7 @@
           <a:p>
             <a:fld id="{4CCD7980-6279-3847-9153-1CCE5938AC85}" type="datetimeFigureOut">
               <a:rPr lang="en-CH" smtClean="0"/>
-              <a:t>20.09.22</a:t>
+              <a:t>20.04.23</a:t>
             </a:fld>
             <a:endParaRPr lang="en-CH"/>
           </a:p>
@@ -671,7 +671,7 @@
           <a:p>
             <a:fld id="{4CCD7980-6279-3847-9153-1CCE5938AC85}" type="datetimeFigureOut">
               <a:rPr lang="en-CH" smtClean="0"/>
-              <a:t>20.09.22</a:t>
+              <a:t>20.04.23</a:t>
             </a:fld>
             <a:endParaRPr lang="en-CH"/>
           </a:p>
@@ -871,7 +871,7 @@
           <a:p>
             <a:fld id="{4CCD7980-6279-3847-9153-1CCE5938AC85}" type="datetimeFigureOut">
               <a:rPr lang="en-CH" smtClean="0"/>
-              <a:t>20.09.22</a:t>
+              <a:t>20.04.23</a:t>
             </a:fld>
             <a:endParaRPr lang="en-CH"/>
           </a:p>
@@ -1147,7 +1147,7 @@
           <a:p>
             <a:fld id="{4CCD7980-6279-3847-9153-1CCE5938AC85}" type="datetimeFigureOut">
               <a:rPr lang="en-CH" smtClean="0"/>
-              <a:t>20.09.22</a:t>
+              <a:t>20.04.23</a:t>
             </a:fld>
             <a:endParaRPr lang="en-CH"/>
           </a:p>
@@ -1415,7 +1415,7 @@
           <a:p>
             <a:fld id="{4CCD7980-6279-3847-9153-1CCE5938AC85}" type="datetimeFigureOut">
               <a:rPr lang="en-CH" smtClean="0"/>
-              <a:t>20.09.22</a:t>
+              <a:t>20.04.23</a:t>
             </a:fld>
             <a:endParaRPr lang="en-CH"/>
           </a:p>
@@ -1830,7 +1830,7 @@
           <a:p>
             <a:fld id="{4CCD7980-6279-3847-9153-1CCE5938AC85}" type="datetimeFigureOut">
               <a:rPr lang="en-CH" smtClean="0"/>
-              <a:t>20.09.22</a:t>
+              <a:t>20.04.23</a:t>
             </a:fld>
             <a:endParaRPr lang="en-CH"/>
           </a:p>
@@ -1972,7 +1972,7 @@
           <a:p>
             <a:fld id="{4CCD7980-6279-3847-9153-1CCE5938AC85}" type="datetimeFigureOut">
               <a:rPr lang="en-CH" smtClean="0"/>
-              <a:t>20.09.22</a:t>
+              <a:t>20.04.23</a:t>
             </a:fld>
             <a:endParaRPr lang="en-CH"/>
           </a:p>
@@ -2085,7 +2085,7 @@
           <a:p>
             <a:fld id="{4CCD7980-6279-3847-9153-1CCE5938AC85}" type="datetimeFigureOut">
               <a:rPr lang="en-CH" smtClean="0"/>
-              <a:t>20.09.22</a:t>
+              <a:t>20.04.23</a:t>
             </a:fld>
             <a:endParaRPr lang="en-CH"/>
           </a:p>
@@ -2398,7 +2398,7 @@
           <a:p>
             <a:fld id="{4CCD7980-6279-3847-9153-1CCE5938AC85}" type="datetimeFigureOut">
               <a:rPr lang="en-CH" smtClean="0"/>
-              <a:t>20.09.22</a:t>
+              <a:t>20.04.23</a:t>
             </a:fld>
             <a:endParaRPr lang="en-CH"/>
           </a:p>
@@ -2687,7 +2687,7 @@
           <a:p>
             <a:fld id="{4CCD7980-6279-3847-9153-1CCE5938AC85}" type="datetimeFigureOut">
               <a:rPr lang="en-CH" smtClean="0"/>
-              <a:t>20.09.22</a:t>
+              <a:t>20.04.23</a:t>
             </a:fld>
             <a:endParaRPr lang="en-CH"/>
           </a:p>
@@ -2930,7 +2930,7 @@
           <a:p>
             <a:fld id="{4CCD7980-6279-3847-9153-1CCE5938AC85}" type="datetimeFigureOut">
               <a:rPr lang="en-CH" smtClean="0"/>
-              <a:t>20.09.22</a:t>
+              <a:t>20.04.23</a:t>
             </a:fld>
             <a:endParaRPr lang="en-CH"/>
           </a:p>
@@ -3361,7 +3361,7 @@
         </p:nvGrpSpPr>
         <p:grpSpPr>
           <a:xfrm>
-            <a:off x="-76200" y="0"/>
+            <a:off x="-1670539" y="105508"/>
             <a:ext cx="12344400" cy="6945086"/>
             <a:chOff x="-76200" y="0"/>
             <a:chExt cx="12344400" cy="6945086"/>
@@ -3408,9 +3408,7 @@
                 <a:avLst/>
               </a:prstGeom>
               <a:solidFill>
-                <a:schemeClr val="bg1">
-                  <a:lumMod val="95000"/>
-                </a:schemeClr>
+                <a:schemeClr val="bg1"/>
               </a:solidFill>
               <a:ln>
                 <a:solidFill>

</xml_diff>